<commit_message>
Updated M3 marking procedure - file naming convention
Updated M3 marking procedure - file naming convention
</commit_message>
<xml_diff>
--- a/Week07-08/M4_slides/Lab4_1.pptx
+++ b/Week07-08/M4_slides/Lab4_1.pptx
@@ -206,7 +206,7 @@
           <a:p>
             <a:fld id="{A9407A57-47BC-45C1-B9EB-906F4463B0AB}" type="datetimeFigureOut">
               <a:rPr lang="en-AU" smtClean="0"/>
-              <a:t>24/08/2024</a:t>
+              <a:t>29/08/2024</a:t>
             </a:fld>
             <a:endParaRPr lang="en-AU"/>
           </a:p>
@@ -810,7 +810,7 @@
           <a:p>
             <a:fld id="{1205BC88-DBF0-4610-A802-A09E0A6ECD22}" type="datetimeFigureOut">
               <a:rPr lang="en-AU" smtClean="0"/>
-              <a:t>24/08/2024</a:t>
+              <a:t>29/08/2024</a:t>
             </a:fld>
             <a:endParaRPr lang="en-AU"/>
           </a:p>
@@ -1038,7 +1038,7 @@
           <a:p>
             <a:fld id="{1205BC88-DBF0-4610-A802-A09E0A6ECD22}" type="datetimeFigureOut">
               <a:rPr lang="en-AU" smtClean="0"/>
-              <a:t>24/08/2024</a:t>
+              <a:t>29/08/2024</a:t>
             </a:fld>
             <a:endParaRPr lang="en-AU"/>
           </a:p>
@@ -1218,7 +1218,7 @@
           <a:p>
             <a:fld id="{1205BC88-DBF0-4610-A802-A09E0A6ECD22}" type="datetimeFigureOut">
               <a:rPr lang="en-AU" smtClean="0"/>
-              <a:t>24/08/2024</a:t>
+              <a:t>29/08/2024</a:t>
             </a:fld>
             <a:endParaRPr lang="en-AU"/>
           </a:p>
@@ -1388,7 +1388,7 @@
           <a:p>
             <a:fld id="{1205BC88-DBF0-4610-A802-A09E0A6ECD22}" type="datetimeFigureOut">
               <a:rPr lang="en-AU" smtClean="0"/>
-              <a:t>24/08/2024</a:t>
+              <a:t>29/08/2024</a:t>
             </a:fld>
             <a:endParaRPr lang="en-AU"/>
           </a:p>
@@ -1642,7 +1642,7 @@
           <a:p>
             <a:fld id="{1205BC88-DBF0-4610-A802-A09E0A6ECD22}" type="datetimeFigureOut">
               <a:rPr lang="en-AU" smtClean="0"/>
-              <a:t>24/08/2024</a:t>
+              <a:t>29/08/2024</a:t>
             </a:fld>
             <a:endParaRPr lang="en-AU"/>
           </a:p>
@@ -1968,7 +1968,7 @@
           <a:p>
             <a:fld id="{1205BC88-DBF0-4610-A802-A09E0A6ECD22}" type="datetimeFigureOut">
               <a:rPr lang="en-AU" smtClean="0"/>
-              <a:t>24/08/2024</a:t>
+              <a:t>29/08/2024</a:t>
             </a:fld>
             <a:endParaRPr lang="en-AU"/>
           </a:p>
@@ -2419,7 +2419,7 @@
           <a:p>
             <a:fld id="{1205BC88-DBF0-4610-A802-A09E0A6ECD22}" type="datetimeFigureOut">
               <a:rPr lang="en-AU" smtClean="0"/>
-              <a:t>24/08/2024</a:t>
+              <a:t>29/08/2024</a:t>
             </a:fld>
             <a:endParaRPr lang="en-AU"/>
           </a:p>
@@ -2537,7 +2537,7 @@
           <a:p>
             <a:fld id="{1205BC88-DBF0-4610-A802-A09E0A6ECD22}" type="datetimeFigureOut">
               <a:rPr lang="en-AU" smtClean="0"/>
-              <a:t>24/08/2024</a:t>
+              <a:t>29/08/2024</a:t>
             </a:fld>
             <a:endParaRPr lang="en-AU"/>
           </a:p>
@@ -2632,7 +2632,7 @@
           <a:p>
             <a:fld id="{1205BC88-DBF0-4610-A802-A09E0A6ECD22}" type="datetimeFigureOut">
               <a:rPr lang="en-AU" smtClean="0"/>
-              <a:t>24/08/2024</a:t>
+              <a:t>29/08/2024</a:t>
             </a:fld>
             <a:endParaRPr lang="en-AU"/>
           </a:p>
@@ -2919,7 +2919,7 @@
           <a:p>
             <a:fld id="{1205BC88-DBF0-4610-A802-A09E0A6ECD22}" type="datetimeFigureOut">
               <a:rPr lang="en-AU" smtClean="0"/>
-              <a:t>24/08/2024</a:t>
+              <a:t>29/08/2024</a:t>
             </a:fld>
             <a:endParaRPr lang="en-AU"/>
           </a:p>
@@ -3241,7 +3241,7 @@
           <a:p>
             <a:fld id="{1205BC88-DBF0-4610-A802-A09E0A6ECD22}" type="datetimeFigureOut">
               <a:rPr lang="en-AU" smtClean="0"/>
-              <a:t>24/08/2024</a:t>
+              <a:t>29/08/2024</a:t>
             </a:fld>
             <a:endParaRPr lang="en-AU"/>
           </a:p>
@@ -3495,7 +3495,7 @@
           <a:p>
             <a:fld id="{1205BC88-DBF0-4610-A802-A09E0A6ECD22}" type="datetimeFigureOut">
               <a:rPr lang="en-AU" smtClean="0"/>
-              <a:t>24/08/2024</a:t>
+              <a:t>29/08/2024</a:t>
             </a:fld>
             <a:endParaRPr lang="en-AU"/>
           </a:p>
@@ -4284,7 +4284,7 @@
         <p:spPr>
           <a:xfrm>
             <a:off x="478180" y="838376"/>
-            <a:ext cx="11527007" cy="4247317"/>
+            <a:ext cx="11527007" cy="5078313"/>
           </a:xfrm>
           <a:prstGeom prst="rect">
             <a:avLst/>
@@ -4327,15 +4327,7 @@
           <a:p>
             <a:r>
               <a:rPr lang="en-GB" dirty="0"/>
-              <a:t>	Check the </a:t>
-            </a:r>
-            <a:r>
-              <a:rPr lang="en-GB"/>
-              <a:t>marking schedul</a:t>
-            </a:r>
-            <a:r>
-              <a:rPr lang="en-GB" dirty="0"/>
-              <a:t>e</a:t>
+              <a:t>	Check the marking schedule</a:t>
             </a:r>
           </a:p>
           <a:p>
@@ -4382,9 +4374,39 @@
           <a:p>
             <a:r>
               <a:rPr lang="en-GB" dirty="0"/>
-              <a:t>	Generate targets.txt after a run with TargetPoseEst.py (save slam.txt and targets.txt with run ID)</a:t>
-            </a:r>
-            <a:endParaRPr lang="en-US" dirty="0"/>
+              <a:t>	</a:t>
+            </a:r>
+            <a:r>
+              <a:rPr lang="en-GB" b="1" dirty="0">
+                <a:solidFill>
+                  <a:srgbClr val="FFFF00"/>
+                </a:solidFill>
+              </a:rPr>
+              <a:t>Generate targets.txt after a run with TargetPoseEst.py (save slam.txt and targets.txt with run ID)</a:t>
+            </a:r>
+          </a:p>
+          <a:p>
+            <a:r>
+              <a:rPr lang="en-GB" b="1" dirty="0">
+                <a:solidFill>
+                  <a:srgbClr val="FFFF00"/>
+                </a:solidFill>
+              </a:rPr>
+              <a:t>		The file name MUST contain the words “slam” and “targets” otherwise </a:t>
+            </a:r>
+            <a:r>
+              <a:rPr lang="en-GB" b="1">
+                <a:solidFill>
+                  <a:srgbClr val="FFFF00"/>
+                </a:solidFill>
+              </a:rPr>
+              <a:t>your milestone run might not be assessed.</a:t>
+            </a:r>
+            <a:endParaRPr lang="en-US" b="1" dirty="0">
+              <a:solidFill>
+                <a:srgbClr val="FFFF00"/>
+              </a:solidFill>
+            </a:endParaRPr>
           </a:p>
           <a:p>
             <a:r>

</xml_diff>